<commit_message>
cutting pattern enumeration algorithm improved!
</commit_message>
<xml_diff>
--- a/report/最適切断の定式化解説.pptx
+++ b/report/最適切断の定式化解説.pptx
@@ -267,7 +267,7 @@
           <a:p>
             <a:fld id="{38E6A907-F722-974F-91D0-52BD50B69080}" type="datetimeFigureOut">
               <a:rPr kumimoji="1" lang="ja-JP" altLang="en-US" smtClean="0"/>
-              <a:t>2025/7/14</a:t>
+              <a:t>2025/7/17</a:t>
             </a:fld>
             <a:endParaRPr kumimoji="1" lang="ja-JP" altLang="en-US"/>
           </a:p>
@@ -497,7 +497,7 @@
           <a:p>
             <a:fld id="{38E6A907-F722-974F-91D0-52BD50B69080}" type="datetimeFigureOut">
               <a:rPr kumimoji="1" lang="ja-JP" altLang="en-US" smtClean="0"/>
-              <a:t>2025/7/14</a:t>
+              <a:t>2025/7/17</a:t>
             </a:fld>
             <a:endParaRPr kumimoji="1" lang="ja-JP" altLang="en-US"/>
           </a:p>
@@ -737,7 +737,7 @@
           <a:p>
             <a:fld id="{38E6A907-F722-974F-91D0-52BD50B69080}" type="datetimeFigureOut">
               <a:rPr kumimoji="1" lang="ja-JP" altLang="en-US" smtClean="0"/>
-              <a:t>2025/7/14</a:t>
+              <a:t>2025/7/17</a:t>
             </a:fld>
             <a:endParaRPr kumimoji="1" lang="ja-JP" altLang="en-US"/>
           </a:p>
@@ -967,7 +967,7 @@
           <a:p>
             <a:fld id="{38E6A907-F722-974F-91D0-52BD50B69080}" type="datetimeFigureOut">
               <a:rPr kumimoji="1" lang="ja-JP" altLang="en-US" smtClean="0"/>
-              <a:t>2025/7/14</a:t>
+              <a:t>2025/7/17</a:t>
             </a:fld>
             <a:endParaRPr kumimoji="1" lang="ja-JP" altLang="en-US"/>
           </a:p>
@@ -1242,7 +1242,7 @@
           <a:p>
             <a:fld id="{38E6A907-F722-974F-91D0-52BD50B69080}" type="datetimeFigureOut">
               <a:rPr kumimoji="1" lang="ja-JP" altLang="en-US" smtClean="0"/>
-              <a:t>2025/7/14</a:t>
+              <a:t>2025/7/17</a:t>
             </a:fld>
             <a:endParaRPr kumimoji="1" lang="ja-JP" altLang="en-US"/>
           </a:p>
@@ -1571,7 +1571,7 @@
           <a:p>
             <a:fld id="{38E6A907-F722-974F-91D0-52BD50B69080}" type="datetimeFigureOut">
               <a:rPr kumimoji="1" lang="ja-JP" altLang="en-US" smtClean="0"/>
-              <a:t>2025/7/14</a:t>
+              <a:t>2025/7/17</a:t>
             </a:fld>
             <a:endParaRPr kumimoji="1" lang="ja-JP" altLang="en-US"/>
           </a:p>
@@ -2047,7 +2047,7 @@
           <a:p>
             <a:fld id="{38E6A907-F722-974F-91D0-52BD50B69080}" type="datetimeFigureOut">
               <a:rPr kumimoji="1" lang="ja-JP" altLang="en-US" smtClean="0"/>
-              <a:t>2025/7/14</a:t>
+              <a:t>2025/7/17</a:t>
             </a:fld>
             <a:endParaRPr kumimoji="1" lang="ja-JP" altLang="en-US"/>
           </a:p>
@@ -2188,7 +2188,7 @@
           <a:p>
             <a:fld id="{38E6A907-F722-974F-91D0-52BD50B69080}" type="datetimeFigureOut">
               <a:rPr kumimoji="1" lang="ja-JP" altLang="en-US" smtClean="0"/>
-              <a:t>2025/7/14</a:t>
+              <a:t>2025/7/17</a:t>
             </a:fld>
             <a:endParaRPr kumimoji="1" lang="ja-JP" altLang="en-US"/>
           </a:p>
@@ -2301,7 +2301,7 @@
           <a:p>
             <a:fld id="{38E6A907-F722-974F-91D0-52BD50B69080}" type="datetimeFigureOut">
               <a:rPr kumimoji="1" lang="ja-JP" altLang="en-US" smtClean="0"/>
-              <a:t>2025/7/14</a:t>
+              <a:t>2025/7/17</a:t>
             </a:fld>
             <a:endParaRPr kumimoji="1" lang="ja-JP" altLang="en-US"/>
           </a:p>
@@ -2644,7 +2644,7 @@
           <a:p>
             <a:fld id="{38E6A907-F722-974F-91D0-52BD50B69080}" type="datetimeFigureOut">
               <a:rPr kumimoji="1" lang="ja-JP" altLang="en-US" smtClean="0"/>
-              <a:t>2025/7/14</a:t>
+              <a:t>2025/7/17</a:t>
             </a:fld>
             <a:endParaRPr kumimoji="1" lang="ja-JP" altLang="en-US"/>
           </a:p>
@@ -2932,7 +2932,7 @@
           <a:p>
             <a:fld id="{38E6A907-F722-974F-91D0-52BD50B69080}" type="datetimeFigureOut">
               <a:rPr kumimoji="1" lang="ja-JP" altLang="en-US" smtClean="0"/>
-              <a:t>2025/7/14</a:t>
+              <a:t>2025/7/17</a:t>
             </a:fld>
             <a:endParaRPr kumimoji="1" lang="ja-JP" altLang="en-US"/>
           </a:p>
@@ -3205,7 +3205,7 @@
           <a:p>
             <a:fld id="{38E6A907-F722-974F-91D0-52BD50B69080}" type="datetimeFigureOut">
               <a:rPr kumimoji="1" lang="ja-JP" altLang="en-US" smtClean="0"/>
-              <a:t>2025/7/14</a:t>
+              <a:t>2025/7/17</a:t>
             </a:fld>
             <a:endParaRPr kumimoji="1" lang="ja-JP" altLang="en-US"/>
           </a:p>
@@ -9537,8 +9537,8 @@
           </p:graphicFrame>
         </mc:Fallback>
       </mc:AlternateContent>
-      <mc:AlternateContent xmlns:mc="http://schemas.openxmlformats.org/markup-compatibility/2006" xmlns:a14="http://schemas.microsoft.com/office/drawing/2010/main">
-        <mc:Choice Requires="a14">
+      <mc:AlternateContent xmlns:mc="http://schemas.openxmlformats.org/markup-compatibility/2006">
+        <mc:Choice xmlns:a14="http://schemas.microsoft.com/office/drawing/2010/main" Requires="a14">
           <p:sp>
             <p:nvSpPr>
               <p:cNvPr id="5" name="コンテンツ プレースホルダー 4">
@@ -9583,7 +9583,7 @@
                 </a14:m>
                 <a:r>
                   <a:rPr lang="ja-JP" altLang="en-US" sz="2000"/>
-                  <a:t>の切出し本数を</a:t>
+                  <a:t>の利用回数を</a:t>
                 </a:r>
                 <a14:m>
                   <m:oMath xmlns:m="http://schemas.openxmlformats.org/officeDocument/2006/math">
@@ -9960,7 +9960,7 @@
             </p:txBody>
           </p:sp>
         </mc:Choice>
-        <mc:Fallback xmlns="">
+        <mc:Fallback>
           <p:sp>
             <p:nvSpPr>
               <p:cNvPr id="5" name="コンテンツ プレースホルダー 4">
@@ -13956,7 +13956,7 @@
                 </a14:m>
                 <a:r>
                   <a:rPr lang="ja-JP" altLang="en-US" sz="2000"/>
-                  <a:t>の切出し本数</a:t>
+                  <a:t>の利用回数</a:t>
                 </a:r>
                 <a:r>
                   <a:rPr lang="en-US" altLang="ja-JP" sz="2000" dirty="0"/>
@@ -14984,8 +14984,8 @@
           </p:sp>
         </mc:Fallback>
       </mc:AlternateContent>
-      <mc:AlternateContent xmlns:mc="http://schemas.openxmlformats.org/markup-compatibility/2006" xmlns:a14="http://schemas.microsoft.com/office/drawing/2010/main">
-        <mc:Choice Requires="a14">
+      <mc:AlternateContent xmlns:mc="http://schemas.openxmlformats.org/markup-compatibility/2006">
+        <mc:Choice xmlns:a14="http://schemas.microsoft.com/office/drawing/2010/main" Requires="a14">
           <p:sp>
             <p:nvSpPr>
               <p:cNvPr id="5" name="コンテンツ プレースホルダー 4">
@@ -15066,7 +15066,7 @@
                 </a14:m>
                 <a:r>
                   <a:rPr lang="ja-JP" altLang="en-US" sz="2000"/>
-                  <a:t>の切出し本数</a:t>
+                  <a:t>の利用回数</a:t>
                 </a:r>
                 <a:endParaRPr lang="en-US" altLang="ja-JP" sz="2000" dirty="0"/>
               </a:p>
@@ -15620,7 +15620,7 @@
             </p:txBody>
           </p:sp>
         </mc:Choice>
-        <mc:Fallback xmlns="">
+        <mc:Fallback>
           <p:sp>
             <p:nvSpPr>
               <p:cNvPr id="5" name="コンテンツ プレースホルダー 4">
@@ -15710,8 +15710,8 @@
           </a:p>
         </p:txBody>
       </p:sp>
-      <mc:AlternateContent xmlns:mc="http://schemas.openxmlformats.org/markup-compatibility/2006">
-        <mc:Choice xmlns:a14="http://schemas.microsoft.com/office/drawing/2010/main" Requires="a14">
+      <mc:AlternateContent xmlns:mc="http://schemas.openxmlformats.org/markup-compatibility/2006" xmlns:a14="http://schemas.microsoft.com/office/drawing/2010/main">
+        <mc:Choice Requires="a14">
           <p:graphicFrame>
             <p:nvGraphicFramePr>
               <p:cNvPr id="4" name="表 3">
@@ -18623,7 +18623,7 @@
             </a:graphic>
           </p:graphicFrame>
         </mc:Choice>
-        <mc:Fallback>
+        <mc:Fallback xmlns="">
           <p:graphicFrame>
             <p:nvGraphicFramePr>
               <p:cNvPr id="4" name="表 3">
@@ -25832,8 +25832,8 @@
           </a:p>
         </p:txBody>
       </p:sp>
-      <mc:AlternateContent xmlns:mc="http://schemas.openxmlformats.org/markup-compatibility/2006">
-        <mc:Choice xmlns:a14="http://schemas.microsoft.com/office/drawing/2010/main" Requires="a14">
+      <mc:AlternateContent xmlns:mc="http://schemas.openxmlformats.org/markup-compatibility/2006" xmlns:a14="http://schemas.microsoft.com/office/drawing/2010/main">
+        <mc:Choice Requires="a14">
           <p:sp>
             <p:nvSpPr>
               <p:cNvPr id="16" name="テキスト ボックス 15">
@@ -26108,7 +26108,7 @@
             </p:txBody>
           </p:sp>
         </mc:Choice>
-        <mc:Fallback>
+        <mc:Fallback xmlns="">
           <p:sp>
             <p:nvSpPr>
               <p:cNvPr id="16" name="テキスト ボックス 15">
@@ -27411,8 +27411,8 @@
               </p:txBody>
             </p:sp>
           </p:grpSp>
-          <mc:AlternateContent xmlns:mc="http://schemas.openxmlformats.org/markup-compatibility/2006">
-            <mc:Choice xmlns:a14="http://schemas.microsoft.com/office/drawing/2010/main" Requires="a14">
+          <mc:AlternateContent xmlns:mc="http://schemas.openxmlformats.org/markup-compatibility/2006" xmlns:a14="http://schemas.microsoft.com/office/drawing/2010/main">
+            <mc:Choice Requires="a14">
               <p:sp>
                 <p:nvSpPr>
                   <p:cNvPr id="13" name="テキスト ボックス 12">
@@ -27534,7 +27534,7 @@
                 </p:txBody>
               </p:sp>
             </mc:Choice>
-            <mc:Fallback>
+            <mc:Fallback xmlns="">
               <p:sp>
                 <p:nvSpPr>
                   <p:cNvPr id="13" name="テキスト ボックス 12">

</xml_diff>